<commit_message>
implement saves and  resume_run
</commit_message>
<xml_diff>
--- a/papers/.ppt/TimeSeriesCV_31052024.pptx
+++ b/papers/.ppt/TimeSeriesCV_31052024.pptx
@@ -8,8 +8,8 @@
     <p:sldId id="256" r:id="rId2"/>
     <p:sldId id="276" r:id="rId3"/>
     <p:sldId id="312" r:id="rId4"/>
-    <p:sldId id="362" r:id="rId5"/>
-    <p:sldId id="345" r:id="rId6"/>
+    <p:sldId id="345" r:id="rId5"/>
+    <p:sldId id="362" r:id="rId6"/>
     <p:sldId id="363" r:id="rId7"/>
     <p:sldId id="359" r:id="rId8"/>
     <p:sldId id="347" r:id="rId9"/>
@@ -138,8 +138,8 @@
           <p14:sldIdLst>
             <p14:sldId id="276"/>
             <p14:sldId id="312"/>
+            <p14:sldId id="345"/>
             <p14:sldId id="362"/>
-            <p14:sldId id="345"/>
             <p14:sldId id="363"/>
             <p14:sldId id="359"/>
             <p14:sldId id="347"/>
@@ -14526,974 +14526,6 @@
           <a:chExt cx="0" cy="0"/>
         </a:xfrm>
       </p:grpSpPr>
-      <p:sp>
-        <p:nvSpPr>
-          <p:cNvPr id="11" name="Title 1">
-            <a:extLst>
-              <a:ext uri="{FF2B5EF4-FFF2-40B4-BE49-F238E27FC236}">
-                <a16:creationId xmlns:a16="http://schemas.microsoft.com/office/drawing/2014/main" id="{862773AA-BC62-4AEE-851B-F2B7440D883C}"/>
-              </a:ext>
-            </a:extLst>
-          </p:cNvPr>
-          <p:cNvSpPr txBox="1">
-            <a:spLocks/>
-          </p:cNvSpPr>
-          <p:nvPr/>
-        </p:nvSpPr>
-        <p:spPr>
-          <a:xfrm>
-            <a:off x="838200" y="365125"/>
-            <a:ext cx="10515600" cy="1325563"/>
-          </a:xfrm>
-          <a:prstGeom prst="rect">
-            <a:avLst/>
-          </a:prstGeom>
-        </p:spPr>
-        <p:txBody>
-          <a:bodyPr vert="horz" lIns="91440" tIns="45720" rIns="91440" bIns="45720" rtlCol="0" anchor="ctr">
-            <a:normAutofit/>
-          </a:bodyPr>
-          <a:lstStyle>
-            <a:lvl1pPr algn="l" defTabSz="914400" rtl="0" eaLnBrk="1" latinLnBrk="0" hangingPunct="1">
-              <a:lnSpc>
-                <a:spcPct val="90000"/>
-              </a:lnSpc>
-              <a:spcBef>
-                <a:spcPct val="0"/>
-              </a:spcBef>
-              <a:buNone/>
-              <a:defRPr sz="4400" kern="1200">
-                <a:solidFill>
-                  <a:schemeClr val="tx1"/>
-                </a:solidFill>
-                <a:latin typeface="+mj-lt"/>
-                <a:ea typeface="+mj-ea"/>
-                <a:cs typeface="+mj-cs"/>
-              </a:defRPr>
-            </a:lvl1pPr>
-          </a:lstStyle>
-          <a:p>
-            <a:r>
-              <a:rPr lang="en-US" dirty="0"/>
-              <a:t>Code Parallelization</a:t>
-            </a:r>
-          </a:p>
-        </p:txBody>
-      </p:sp>
-      <p:sp>
-        <p:nvSpPr>
-          <p:cNvPr id="16" name="Cube 15">
-            <a:extLst>
-              <a:ext uri="{FF2B5EF4-FFF2-40B4-BE49-F238E27FC236}">
-                <a16:creationId xmlns:a16="http://schemas.microsoft.com/office/drawing/2014/main" id="{75C03A65-967A-4A9B-B4E9-7ECDD124D2C4}"/>
-              </a:ext>
-            </a:extLst>
-          </p:cNvPr>
-          <p:cNvSpPr/>
-          <p:nvPr/>
-        </p:nvSpPr>
-        <p:spPr>
-          <a:xfrm>
-            <a:off x="2988734" y="2147355"/>
-            <a:ext cx="1210733" cy="1083733"/>
-          </a:xfrm>
-          <a:prstGeom prst="cube">
-            <a:avLst>
-              <a:gd name="adj" fmla="val 19624"/>
-            </a:avLst>
-          </a:prstGeom>
-          <a:noFill/>
-          <a:ln w="28575">
-            <a:solidFill>
-              <a:schemeClr val="tx1"/>
-            </a:solidFill>
-          </a:ln>
-        </p:spPr>
-        <p:style>
-          <a:lnRef idx="2">
-            <a:schemeClr val="accent1">
-              <a:shade val="50000"/>
-            </a:schemeClr>
-          </a:lnRef>
-          <a:fillRef idx="1">
-            <a:schemeClr val="accent1"/>
-          </a:fillRef>
-          <a:effectRef idx="0">
-            <a:schemeClr val="accent1"/>
-          </a:effectRef>
-          <a:fontRef idx="minor">
-            <a:schemeClr val="lt1"/>
-          </a:fontRef>
-        </p:style>
-        <p:txBody>
-          <a:bodyPr rtlCol="0" anchor="ctr"/>
-          <a:lstStyle/>
-          <a:p>
-            <a:pPr algn="ctr"/>
-            <a:r>
-              <a:rPr lang="en-US" sz="800" dirty="0">
-                <a:solidFill>
-                  <a:schemeClr val="tx1"/>
-                </a:solidFill>
-                <a:latin typeface="Microsoft JhengHei" panose="020B0604030504040204" pitchFamily="34" charset="-120"/>
-                <a:ea typeface="Microsoft JhengHei" panose="020B0604030504040204" pitchFamily="34" charset="-120"/>
-              </a:rPr>
-              <a:t>ComputerNew1</a:t>
-            </a:r>
-          </a:p>
-        </p:txBody>
-      </p:sp>
-      <p:sp>
-        <p:nvSpPr>
-          <p:cNvPr id="17" name="Cube 16">
-            <a:extLst>
-              <a:ext uri="{FF2B5EF4-FFF2-40B4-BE49-F238E27FC236}">
-                <a16:creationId xmlns:a16="http://schemas.microsoft.com/office/drawing/2014/main" id="{7C8A192A-11A8-414F-BB34-9C1FEE37B16F}"/>
-              </a:ext>
-            </a:extLst>
-          </p:cNvPr>
-          <p:cNvSpPr/>
-          <p:nvPr/>
-        </p:nvSpPr>
-        <p:spPr>
-          <a:xfrm>
-            <a:off x="4343401" y="2147355"/>
-            <a:ext cx="1210733" cy="1083733"/>
-          </a:xfrm>
-          <a:prstGeom prst="cube">
-            <a:avLst>
-              <a:gd name="adj" fmla="val 19624"/>
-            </a:avLst>
-          </a:prstGeom>
-          <a:noFill/>
-          <a:ln w="28575">
-            <a:solidFill>
-              <a:schemeClr val="tx1"/>
-            </a:solidFill>
-          </a:ln>
-        </p:spPr>
-        <p:style>
-          <a:lnRef idx="2">
-            <a:schemeClr val="accent1">
-              <a:shade val="50000"/>
-            </a:schemeClr>
-          </a:lnRef>
-          <a:fillRef idx="1">
-            <a:schemeClr val="accent1"/>
-          </a:fillRef>
-          <a:effectRef idx="0">
-            <a:schemeClr val="accent1"/>
-          </a:effectRef>
-          <a:fontRef idx="minor">
-            <a:schemeClr val="lt1"/>
-          </a:fontRef>
-        </p:style>
-        <p:txBody>
-          <a:bodyPr rtlCol="0" anchor="ctr"/>
-          <a:lstStyle/>
-          <a:p>
-            <a:pPr algn="ctr"/>
-            <a:r>
-              <a:rPr lang="en-US" sz="800" dirty="0">
-                <a:solidFill>
-                  <a:schemeClr val="tx1"/>
-                </a:solidFill>
-                <a:latin typeface="Microsoft JhengHei" panose="020B0604030504040204" pitchFamily="34" charset="-120"/>
-                <a:ea typeface="Microsoft JhengHei" panose="020B0604030504040204" pitchFamily="34" charset="-120"/>
-              </a:rPr>
-              <a:t>ComputerNew2</a:t>
-            </a:r>
-          </a:p>
-        </p:txBody>
-      </p:sp>
-      <p:sp>
-        <p:nvSpPr>
-          <p:cNvPr id="18" name="Cube 17">
-            <a:extLst>
-              <a:ext uri="{FF2B5EF4-FFF2-40B4-BE49-F238E27FC236}">
-                <a16:creationId xmlns:a16="http://schemas.microsoft.com/office/drawing/2014/main" id="{75AF2877-7918-4495-A821-8EE62EF74E05}"/>
-              </a:ext>
-            </a:extLst>
-          </p:cNvPr>
-          <p:cNvSpPr/>
-          <p:nvPr/>
-        </p:nvSpPr>
-        <p:spPr>
-          <a:xfrm>
-            <a:off x="5710766" y="2147355"/>
-            <a:ext cx="1210733" cy="1083733"/>
-          </a:xfrm>
-          <a:prstGeom prst="cube">
-            <a:avLst>
-              <a:gd name="adj" fmla="val 19624"/>
-            </a:avLst>
-          </a:prstGeom>
-          <a:noFill/>
-          <a:ln w="28575">
-            <a:solidFill>
-              <a:schemeClr val="tx1"/>
-            </a:solidFill>
-          </a:ln>
-        </p:spPr>
-        <p:style>
-          <a:lnRef idx="2">
-            <a:schemeClr val="accent1">
-              <a:shade val="50000"/>
-            </a:schemeClr>
-          </a:lnRef>
-          <a:fillRef idx="1">
-            <a:schemeClr val="accent1"/>
-          </a:fillRef>
-          <a:effectRef idx="0">
-            <a:schemeClr val="accent1"/>
-          </a:effectRef>
-          <a:fontRef idx="minor">
-            <a:schemeClr val="lt1"/>
-          </a:fontRef>
-        </p:style>
-        <p:txBody>
-          <a:bodyPr rtlCol="0" anchor="ctr"/>
-          <a:lstStyle/>
-          <a:p>
-            <a:pPr algn="ctr"/>
-            <a:r>
-              <a:rPr lang="en-US" sz="800" dirty="0">
-                <a:solidFill>
-                  <a:schemeClr val="tx1"/>
-                </a:solidFill>
-                <a:latin typeface="Microsoft JhengHei" panose="020B0604030504040204" pitchFamily="34" charset="-120"/>
-                <a:ea typeface="Microsoft JhengHei" panose="020B0604030504040204" pitchFamily="34" charset="-120"/>
-              </a:rPr>
-              <a:t>ComputerOld1</a:t>
-            </a:r>
-          </a:p>
-        </p:txBody>
-      </p:sp>
-      <p:sp>
-        <p:nvSpPr>
-          <p:cNvPr id="19" name="Cube 18">
-            <a:extLst>
-              <a:ext uri="{FF2B5EF4-FFF2-40B4-BE49-F238E27FC236}">
-                <a16:creationId xmlns:a16="http://schemas.microsoft.com/office/drawing/2014/main" id="{F0BC7486-FEDF-4092-A144-0E7EB818219A}"/>
-              </a:ext>
-            </a:extLst>
-          </p:cNvPr>
-          <p:cNvSpPr/>
-          <p:nvPr/>
-        </p:nvSpPr>
-        <p:spPr>
-          <a:xfrm>
-            <a:off x="7141633" y="2147355"/>
-            <a:ext cx="1210733" cy="1083733"/>
-          </a:xfrm>
-          <a:prstGeom prst="cube">
-            <a:avLst>
-              <a:gd name="adj" fmla="val 19624"/>
-            </a:avLst>
-          </a:prstGeom>
-          <a:noFill/>
-          <a:ln w="28575">
-            <a:solidFill>
-              <a:schemeClr val="tx1"/>
-            </a:solidFill>
-          </a:ln>
-        </p:spPr>
-        <p:style>
-          <a:lnRef idx="2">
-            <a:schemeClr val="accent1">
-              <a:shade val="50000"/>
-            </a:schemeClr>
-          </a:lnRef>
-          <a:fillRef idx="1">
-            <a:schemeClr val="accent1"/>
-          </a:fillRef>
-          <a:effectRef idx="0">
-            <a:schemeClr val="accent1"/>
-          </a:effectRef>
-          <a:fontRef idx="minor">
-            <a:schemeClr val="lt1"/>
-          </a:fontRef>
-        </p:style>
-        <p:txBody>
-          <a:bodyPr rtlCol="0" anchor="ctr"/>
-          <a:lstStyle/>
-          <a:p>
-            <a:pPr algn="ctr"/>
-            <a:r>
-              <a:rPr lang="en-US" sz="800" dirty="0">
-                <a:solidFill>
-                  <a:schemeClr val="tx1"/>
-                </a:solidFill>
-                <a:latin typeface="Microsoft JhengHei" panose="020B0604030504040204" pitchFamily="34" charset="-120"/>
-                <a:ea typeface="Microsoft JhengHei" panose="020B0604030504040204" pitchFamily="34" charset="-120"/>
-              </a:rPr>
-              <a:t>ComputerOld2</a:t>
-            </a:r>
-          </a:p>
-        </p:txBody>
-      </p:sp>
-      <p:sp>
-        <p:nvSpPr>
-          <p:cNvPr id="20" name="Cube 19">
-            <a:extLst>
-              <a:ext uri="{FF2B5EF4-FFF2-40B4-BE49-F238E27FC236}">
-                <a16:creationId xmlns:a16="http://schemas.microsoft.com/office/drawing/2014/main" id="{13D37479-399F-4957-A7C6-8387A5895065}"/>
-              </a:ext>
-            </a:extLst>
-          </p:cNvPr>
-          <p:cNvSpPr/>
-          <p:nvPr/>
-        </p:nvSpPr>
-        <p:spPr>
-          <a:xfrm>
-            <a:off x="2988734" y="4366774"/>
-            <a:ext cx="1210733" cy="1083733"/>
-          </a:xfrm>
-          <a:prstGeom prst="cube">
-            <a:avLst>
-              <a:gd name="adj" fmla="val 19624"/>
-            </a:avLst>
-          </a:prstGeom>
-          <a:noFill/>
-          <a:ln w="28575">
-            <a:solidFill>
-              <a:schemeClr val="tx1"/>
-            </a:solidFill>
-          </a:ln>
-        </p:spPr>
-        <p:style>
-          <a:lnRef idx="2">
-            <a:schemeClr val="accent1">
-              <a:shade val="50000"/>
-            </a:schemeClr>
-          </a:lnRef>
-          <a:fillRef idx="1">
-            <a:schemeClr val="accent1"/>
-          </a:fillRef>
-          <a:effectRef idx="0">
-            <a:schemeClr val="accent1"/>
-          </a:effectRef>
-          <a:fontRef idx="minor">
-            <a:schemeClr val="lt1"/>
-          </a:fontRef>
-        </p:style>
-        <p:txBody>
-          <a:bodyPr rtlCol="0" anchor="ctr"/>
-          <a:lstStyle/>
-          <a:p>
-            <a:pPr algn="ctr"/>
-            <a:r>
-              <a:rPr lang="en-US" sz="800" dirty="0">
-                <a:solidFill>
-                  <a:schemeClr val="tx1"/>
-                </a:solidFill>
-                <a:latin typeface="Microsoft JhengHei" panose="020B0604030504040204" pitchFamily="34" charset="-120"/>
-                <a:ea typeface="Microsoft JhengHei" panose="020B0604030504040204" pitchFamily="34" charset="-120"/>
-              </a:rPr>
-              <a:t>Colab1</a:t>
-            </a:r>
-          </a:p>
-        </p:txBody>
-      </p:sp>
-      <p:sp>
-        <p:nvSpPr>
-          <p:cNvPr id="21" name="Cube 20">
-            <a:extLst>
-              <a:ext uri="{FF2B5EF4-FFF2-40B4-BE49-F238E27FC236}">
-                <a16:creationId xmlns:a16="http://schemas.microsoft.com/office/drawing/2014/main" id="{79A342B8-D08C-4B31-92EC-3A2A09B37437}"/>
-              </a:ext>
-            </a:extLst>
-          </p:cNvPr>
-          <p:cNvSpPr/>
-          <p:nvPr/>
-        </p:nvSpPr>
-        <p:spPr>
-          <a:xfrm>
-            <a:off x="4419601" y="4366774"/>
-            <a:ext cx="1210733" cy="1083733"/>
-          </a:xfrm>
-          <a:prstGeom prst="cube">
-            <a:avLst>
-              <a:gd name="adj" fmla="val 19624"/>
-            </a:avLst>
-          </a:prstGeom>
-          <a:noFill/>
-          <a:ln w="28575">
-            <a:solidFill>
-              <a:schemeClr val="tx1"/>
-            </a:solidFill>
-          </a:ln>
-        </p:spPr>
-        <p:style>
-          <a:lnRef idx="2">
-            <a:schemeClr val="accent1">
-              <a:shade val="50000"/>
-            </a:schemeClr>
-          </a:lnRef>
-          <a:fillRef idx="1">
-            <a:schemeClr val="accent1"/>
-          </a:fillRef>
-          <a:effectRef idx="0">
-            <a:schemeClr val="accent1"/>
-          </a:effectRef>
-          <a:fontRef idx="minor">
-            <a:schemeClr val="lt1"/>
-          </a:fontRef>
-        </p:style>
-        <p:txBody>
-          <a:bodyPr rtlCol="0" anchor="ctr"/>
-          <a:lstStyle/>
-          <a:p>
-            <a:pPr algn="ctr"/>
-            <a:r>
-              <a:rPr lang="en-US" sz="800" dirty="0">
-                <a:solidFill>
-                  <a:schemeClr val="tx1"/>
-                </a:solidFill>
-                <a:latin typeface="Microsoft JhengHei" panose="020B0604030504040204" pitchFamily="34" charset="-120"/>
-                <a:ea typeface="Microsoft JhengHei" panose="020B0604030504040204" pitchFamily="34" charset="-120"/>
-              </a:rPr>
-              <a:t>Colab2</a:t>
-            </a:r>
-          </a:p>
-        </p:txBody>
-      </p:sp>
-      <p:sp>
-        <p:nvSpPr>
-          <p:cNvPr id="22" name="Cube 21">
-            <a:extLst>
-              <a:ext uri="{FF2B5EF4-FFF2-40B4-BE49-F238E27FC236}">
-                <a16:creationId xmlns:a16="http://schemas.microsoft.com/office/drawing/2014/main" id="{5AFD9427-1498-47BB-8FE3-A4AA29FD3964}"/>
-              </a:ext>
-            </a:extLst>
-          </p:cNvPr>
-          <p:cNvSpPr/>
-          <p:nvPr/>
-        </p:nvSpPr>
-        <p:spPr>
-          <a:xfrm>
-            <a:off x="5786966" y="4366774"/>
-            <a:ext cx="1210733" cy="1083733"/>
-          </a:xfrm>
-          <a:prstGeom prst="cube">
-            <a:avLst>
-              <a:gd name="adj" fmla="val 19624"/>
-            </a:avLst>
-          </a:prstGeom>
-          <a:noFill/>
-          <a:ln w="28575">
-            <a:solidFill>
-              <a:schemeClr val="tx1"/>
-            </a:solidFill>
-          </a:ln>
-        </p:spPr>
-        <p:style>
-          <a:lnRef idx="2">
-            <a:schemeClr val="accent1">
-              <a:shade val="50000"/>
-            </a:schemeClr>
-          </a:lnRef>
-          <a:fillRef idx="1">
-            <a:schemeClr val="accent1"/>
-          </a:fillRef>
-          <a:effectRef idx="0">
-            <a:schemeClr val="accent1"/>
-          </a:effectRef>
-          <a:fontRef idx="minor">
-            <a:schemeClr val="lt1"/>
-          </a:fontRef>
-        </p:style>
-        <p:txBody>
-          <a:bodyPr rtlCol="0" anchor="ctr"/>
-          <a:lstStyle/>
-          <a:p>
-            <a:pPr algn="ctr"/>
-            <a:r>
-              <a:rPr lang="en-US" sz="800" dirty="0">
-                <a:solidFill>
-                  <a:schemeClr val="tx1"/>
-                </a:solidFill>
-                <a:latin typeface="Microsoft JhengHei" panose="020B0604030504040204" pitchFamily="34" charset="-120"/>
-                <a:ea typeface="Microsoft JhengHei" panose="020B0604030504040204" pitchFamily="34" charset="-120"/>
-              </a:rPr>
-              <a:t>Colab3</a:t>
-            </a:r>
-          </a:p>
-        </p:txBody>
-      </p:sp>
-      <p:sp>
-        <p:nvSpPr>
-          <p:cNvPr id="23" name="Cube 22">
-            <a:extLst>
-              <a:ext uri="{FF2B5EF4-FFF2-40B4-BE49-F238E27FC236}">
-                <a16:creationId xmlns:a16="http://schemas.microsoft.com/office/drawing/2014/main" id="{935BB193-DEA9-4029-A413-DC4F6ED7E38F}"/>
-              </a:ext>
-            </a:extLst>
-          </p:cNvPr>
-          <p:cNvSpPr/>
-          <p:nvPr/>
-        </p:nvSpPr>
-        <p:spPr>
-          <a:xfrm>
-            <a:off x="7217833" y="4366774"/>
-            <a:ext cx="1210733" cy="1083733"/>
-          </a:xfrm>
-          <a:prstGeom prst="cube">
-            <a:avLst>
-              <a:gd name="adj" fmla="val 19624"/>
-            </a:avLst>
-          </a:prstGeom>
-          <a:noFill/>
-          <a:ln w="28575">
-            <a:solidFill>
-              <a:schemeClr val="tx1"/>
-            </a:solidFill>
-          </a:ln>
-        </p:spPr>
-        <p:style>
-          <a:lnRef idx="2">
-            <a:schemeClr val="accent1">
-              <a:shade val="50000"/>
-            </a:schemeClr>
-          </a:lnRef>
-          <a:fillRef idx="1">
-            <a:schemeClr val="accent1"/>
-          </a:fillRef>
-          <a:effectRef idx="0">
-            <a:schemeClr val="accent1"/>
-          </a:effectRef>
-          <a:fontRef idx="minor">
-            <a:schemeClr val="lt1"/>
-          </a:fontRef>
-        </p:style>
-        <p:txBody>
-          <a:bodyPr rtlCol="0" anchor="ctr"/>
-          <a:lstStyle/>
-          <a:p>
-            <a:pPr algn="ctr"/>
-            <a:r>
-              <a:rPr lang="en-US" sz="800" dirty="0">
-                <a:solidFill>
-                  <a:schemeClr val="tx1"/>
-                </a:solidFill>
-                <a:latin typeface="Microsoft JhengHei" panose="020B0604030504040204" pitchFamily="34" charset="-120"/>
-                <a:ea typeface="Microsoft JhengHei" panose="020B0604030504040204" pitchFamily="34" charset="-120"/>
-              </a:rPr>
-              <a:t>Colab4</a:t>
-            </a:r>
-          </a:p>
-        </p:txBody>
-      </p:sp>
-      <p:sp>
-        <p:nvSpPr>
-          <p:cNvPr id="32" name="TextBox 31">
-            <a:extLst>
-              <a:ext uri="{FF2B5EF4-FFF2-40B4-BE49-F238E27FC236}">
-                <a16:creationId xmlns:a16="http://schemas.microsoft.com/office/drawing/2014/main" id="{B6D4D738-0B22-46C3-BF0C-ED2DEBD786E3}"/>
-              </a:ext>
-            </a:extLst>
-          </p:cNvPr>
-          <p:cNvSpPr txBox="1"/>
-          <p:nvPr/>
-        </p:nvSpPr>
-        <p:spPr>
-          <a:xfrm>
-            <a:off x="2988734" y="5591302"/>
-            <a:ext cx="1060450" cy="276999"/>
-          </a:xfrm>
-          <a:prstGeom prst="rect">
-            <a:avLst/>
-          </a:prstGeom>
-          <a:noFill/>
-        </p:spPr>
-        <p:txBody>
-          <a:bodyPr wrap="square">
-            <a:spAutoFit/>
-          </a:bodyPr>
-          <a:lstStyle/>
-          <a:p>
-            <a:r>
-              <a:rPr lang="en-US" sz="1200" dirty="0" err="1"/>
-              <a:t>Meteorologia</a:t>
-            </a:r>
-            <a:endParaRPr lang="en-US" dirty="0"/>
-          </a:p>
-        </p:txBody>
-      </p:sp>
-      <p:sp>
-        <p:nvSpPr>
-          <p:cNvPr id="34" name="TextBox 33">
-            <a:extLst>
-              <a:ext uri="{FF2B5EF4-FFF2-40B4-BE49-F238E27FC236}">
-                <a16:creationId xmlns:a16="http://schemas.microsoft.com/office/drawing/2014/main" id="{01833DF9-7A16-41EF-BE5D-EAF5F03A59D0}"/>
-              </a:ext>
-            </a:extLst>
-          </p:cNvPr>
-          <p:cNvSpPr txBox="1"/>
-          <p:nvPr/>
-        </p:nvSpPr>
-        <p:spPr>
-          <a:xfrm>
-            <a:off x="5923494" y="3326619"/>
-            <a:ext cx="1060450" cy="276999"/>
-          </a:xfrm>
-          <a:prstGeom prst="rect">
-            <a:avLst/>
-          </a:prstGeom>
-          <a:noFill/>
-        </p:spPr>
-        <p:txBody>
-          <a:bodyPr wrap="square">
-            <a:spAutoFit/>
-          </a:bodyPr>
-          <a:lstStyle/>
-          <a:p>
-            <a:r>
-              <a:rPr lang="en-US" sz="1200" dirty="0" err="1"/>
-              <a:t>Saúde</a:t>
-            </a:r>
-            <a:endParaRPr lang="en-US" dirty="0"/>
-          </a:p>
-        </p:txBody>
-      </p:sp>
-      <p:sp>
-        <p:nvSpPr>
-          <p:cNvPr id="35" name="TextBox 34">
-            <a:extLst>
-              <a:ext uri="{FF2B5EF4-FFF2-40B4-BE49-F238E27FC236}">
-                <a16:creationId xmlns:a16="http://schemas.microsoft.com/office/drawing/2014/main" id="{4D3DF903-4F16-4C4E-94C2-5F9E8620C213}"/>
-              </a:ext>
-            </a:extLst>
-          </p:cNvPr>
-          <p:cNvSpPr txBox="1"/>
-          <p:nvPr/>
-        </p:nvSpPr>
-        <p:spPr>
-          <a:xfrm>
-            <a:off x="7292974" y="3347967"/>
-            <a:ext cx="1060450" cy="276999"/>
-          </a:xfrm>
-          <a:prstGeom prst="rect">
-            <a:avLst/>
-          </a:prstGeom>
-          <a:noFill/>
-        </p:spPr>
-        <p:txBody>
-          <a:bodyPr wrap="square">
-            <a:spAutoFit/>
-          </a:bodyPr>
-          <a:lstStyle/>
-          <a:p>
-            <a:r>
-              <a:rPr lang="en-US" sz="1200" dirty="0" err="1"/>
-              <a:t>Ambiente</a:t>
-            </a:r>
-            <a:endParaRPr lang="en-US" dirty="0"/>
-          </a:p>
-        </p:txBody>
-      </p:sp>
-      <p:sp>
-        <p:nvSpPr>
-          <p:cNvPr id="36" name="TextBox 35">
-            <a:extLst>
-              <a:ext uri="{FF2B5EF4-FFF2-40B4-BE49-F238E27FC236}">
-                <a16:creationId xmlns:a16="http://schemas.microsoft.com/office/drawing/2014/main" id="{DA82FB58-CBC8-458C-B8EF-F63EE65D41FB}"/>
-              </a:ext>
-            </a:extLst>
-          </p:cNvPr>
-          <p:cNvSpPr txBox="1"/>
-          <p:nvPr/>
-        </p:nvSpPr>
-        <p:spPr>
-          <a:xfrm>
-            <a:off x="4343400" y="3367317"/>
-            <a:ext cx="1210733" cy="276999"/>
-          </a:xfrm>
-          <a:prstGeom prst="rect">
-            <a:avLst/>
-          </a:prstGeom>
-          <a:noFill/>
-        </p:spPr>
-        <p:txBody>
-          <a:bodyPr wrap="square">
-            <a:spAutoFit/>
-          </a:bodyPr>
-          <a:lstStyle/>
-          <a:p>
-            <a:r>
-              <a:rPr lang="en-US" sz="1200" dirty="0"/>
-              <a:t>Synthetic2 (100)</a:t>
-            </a:r>
-            <a:endParaRPr lang="en-US" dirty="0"/>
-          </a:p>
-        </p:txBody>
-      </p:sp>
-      <p:sp>
-        <p:nvSpPr>
-          <p:cNvPr id="39" name="TextBox 38">
-            <a:extLst>
-              <a:ext uri="{FF2B5EF4-FFF2-40B4-BE49-F238E27FC236}">
-                <a16:creationId xmlns:a16="http://schemas.microsoft.com/office/drawing/2014/main" id="{DB287132-0E88-4361-9769-23F4415BE703}"/>
-              </a:ext>
-            </a:extLst>
-          </p:cNvPr>
-          <p:cNvSpPr txBox="1"/>
-          <p:nvPr/>
-        </p:nvSpPr>
-        <p:spPr>
-          <a:xfrm>
-            <a:off x="4338109" y="5591302"/>
-            <a:ext cx="1615016" cy="276999"/>
-          </a:xfrm>
-          <a:prstGeom prst="rect">
-            <a:avLst/>
-          </a:prstGeom>
-          <a:noFill/>
-        </p:spPr>
-        <p:txBody>
-          <a:bodyPr wrap="square">
-            <a:spAutoFit/>
-          </a:bodyPr>
-          <a:lstStyle/>
-          <a:p>
-            <a:r>
-              <a:rPr lang="en-US" sz="1200" dirty="0"/>
-              <a:t>Economia/</a:t>
-            </a:r>
-            <a:r>
-              <a:rPr lang="en-US" sz="1200" dirty="0" err="1"/>
-              <a:t>Finanças</a:t>
-            </a:r>
-            <a:endParaRPr lang="en-US" sz="1200" dirty="0"/>
-          </a:p>
-        </p:txBody>
-      </p:sp>
-      <p:sp>
-        <p:nvSpPr>
-          <p:cNvPr id="40" name="TextBox 39">
-            <a:extLst>
-              <a:ext uri="{FF2B5EF4-FFF2-40B4-BE49-F238E27FC236}">
-                <a16:creationId xmlns:a16="http://schemas.microsoft.com/office/drawing/2014/main" id="{E3C6EDFB-F868-4F47-A35C-2CAA20A0D67B}"/>
-              </a:ext>
-            </a:extLst>
-          </p:cNvPr>
-          <p:cNvSpPr txBox="1"/>
-          <p:nvPr/>
-        </p:nvSpPr>
-        <p:spPr>
-          <a:xfrm>
-            <a:off x="4308478" y="3625987"/>
-            <a:ext cx="1615016" cy="276999"/>
-          </a:xfrm>
-          <a:prstGeom prst="rect">
-            <a:avLst/>
-          </a:prstGeom>
-          <a:noFill/>
-        </p:spPr>
-        <p:txBody>
-          <a:bodyPr wrap="square">
-            <a:spAutoFit/>
-          </a:bodyPr>
-          <a:lstStyle/>
-          <a:p>
-            <a:r>
-              <a:rPr lang="en-US" sz="1200" dirty="0" err="1"/>
-              <a:t>Engenharia</a:t>
-            </a:r>
-            <a:r>
-              <a:rPr lang="en-US" sz="1200" dirty="0"/>
-              <a:t>/</a:t>
-            </a:r>
-            <a:r>
-              <a:rPr lang="en-US" sz="1200" dirty="0" err="1"/>
-              <a:t>Ciência</a:t>
-            </a:r>
-            <a:endParaRPr lang="en-US" sz="1200" dirty="0"/>
-          </a:p>
-        </p:txBody>
-      </p:sp>
-      <p:sp>
-        <p:nvSpPr>
-          <p:cNvPr id="41" name="TextBox 40">
-            <a:extLst>
-              <a:ext uri="{FF2B5EF4-FFF2-40B4-BE49-F238E27FC236}">
-                <a16:creationId xmlns:a16="http://schemas.microsoft.com/office/drawing/2014/main" id="{B1B77228-F59D-426A-81F6-53FA0EA18485}"/>
-              </a:ext>
-            </a:extLst>
-          </p:cNvPr>
-          <p:cNvSpPr txBox="1"/>
-          <p:nvPr/>
-        </p:nvSpPr>
-        <p:spPr>
-          <a:xfrm>
-            <a:off x="5953125" y="5551557"/>
-            <a:ext cx="1134533" cy="461665"/>
-          </a:xfrm>
-          <a:prstGeom prst="rect">
-            <a:avLst/>
-          </a:prstGeom>
-          <a:noFill/>
-        </p:spPr>
-        <p:txBody>
-          <a:bodyPr wrap="square">
-            <a:spAutoFit/>
-          </a:bodyPr>
-          <a:lstStyle/>
-          <a:p>
-            <a:r>
-              <a:rPr lang="en-US" sz="1200" dirty="0" err="1"/>
-              <a:t>Transportes</a:t>
-            </a:r>
-            <a:r>
-              <a:rPr lang="en-US" sz="1200" dirty="0"/>
-              <a:t> e </a:t>
-            </a:r>
-            <a:r>
-              <a:rPr lang="en-US" sz="1200" dirty="0" err="1"/>
-              <a:t>Ambiente</a:t>
-            </a:r>
-            <a:endParaRPr lang="en-US" sz="1200" dirty="0"/>
-          </a:p>
-        </p:txBody>
-      </p:sp>
-      <p:sp>
-        <p:nvSpPr>
-          <p:cNvPr id="42" name="TextBox 41">
-            <a:extLst>
-              <a:ext uri="{FF2B5EF4-FFF2-40B4-BE49-F238E27FC236}">
-                <a16:creationId xmlns:a16="http://schemas.microsoft.com/office/drawing/2014/main" id="{85659775-8091-4F06-B62B-955B4AC5C232}"/>
-              </a:ext>
-            </a:extLst>
-          </p:cNvPr>
-          <p:cNvSpPr txBox="1"/>
-          <p:nvPr/>
-        </p:nvSpPr>
-        <p:spPr>
-          <a:xfrm>
-            <a:off x="2988733" y="3321186"/>
-            <a:ext cx="1273175" cy="276999"/>
-          </a:xfrm>
-          <a:prstGeom prst="rect">
-            <a:avLst/>
-          </a:prstGeom>
-          <a:noFill/>
-        </p:spPr>
-        <p:txBody>
-          <a:bodyPr wrap="square">
-            <a:spAutoFit/>
-          </a:bodyPr>
-          <a:lstStyle/>
-          <a:p>
-            <a:r>
-              <a:rPr lang="en-US" sz="1200" dirty="0"/>
-              <a:t>Synthetic1 (100)</a:t>
-            </a:r>
-            <a:endParaRPr lang="en-US" dirty="0"/>
-          </a:p>
-        </p:txBody>
-      </p:sp>
-      <p:sp>
-        <p:nvSpPr>
-          <p:cNvPr id="43" name="TextBox 42">
-            <a:extLst>
-              <a:ext uri="{FF2B5EF4-FFF2-40B4-BE49-F238E27FC236}">
-                <a16:creationId xmlns:a16="http://schemas.microsoft.com/office/drawing/2014/main" id="{C432B307-74B9-4158-A2A1-33192E614265}"/>
-              </a:ext>
-            </a:extLst>
-          </p:cNvPr>
-          <p:cNvSpPr txBox="1"/>
-          <p:nvPr/>
-        </p:nvSpPr>
-        <p:spPr>
-          <a:xfrm>
-            <a:off x="2988733" y="3633108"/>
-            <a:ext cx="1210733" cy="276999"/>
-          </a:xfrm>
-          <a:prstGeom prst="rect">
-            <a:avLst/>
-          </a:prstGeom>
-          <a:noFill/>
-        </p:spPr>
-        <p:txBody>
-          <a:bodyPr wrap="square">
-            <a:spAutoFit/>
-          </a:bodyPr>
-          <a:lstStyle/>
-          <a:p>
-            <a:r>
-              <a:rPr lang="en-US" sz="1200" dirty="0"/>
-              <a:t>Synthetic3 (100)</a:t>
-            </a:r>
-            <a:endParaRPr lang="en-US" dirty="0"/>
-          </a:p>
-        </p:txBody>
-      </p:sp>
-      <p:sp>
-        <p:nvSpPr>
-          <p:cNvPr id="44" name="TextBox 43">
-            <a:extLst>
-              <a:ext uri="{FF2B5EF4-FFF2-40B4-BE49-F238E27FC236}">
-                <a16:creationId xmlns:a16="http://schemas.microsoft.com/office/drawing/2014/main" id="{253AF8D6-5BF9-4C1C-9C24-869D72D88A6F}"/>
-              </a:ext>
-            </a:extLst>
-          </p:cNvPr>
-          <p:cNvSpPr txBox="1"/>
-          <p:nvPr/>
-        </p:nvSpPr>
-        <p:spPr>
-          <a:xfrm>
-            <a:off x="7368116" y="5591302"/>
-            <a:ext cx="1060450" cy="276999"/>
-          </a:xfrm>
-          <a:prstGeom prst="rect">
-            <a:avLst/>
-          </a:prstGeom>
-          <a:noFill/>
-        </p:spPr>
-        <p:txBody>
-          <a:bodyPr wrap="square">
-            <a:spAutoFit/>
-          </a:bodyPr>
-          <a:lstStyle/>
-          <a:p>
-            <a:r>
-              <a:rPr lang="en-US" sz="1200" dirty="0" err="1"/>
-              <a:t>Energia</a:t>
-            </a:r>
-            <a:endParaRPr lang="en-US" dirty="0"/>
-          </a:p>
-        </p:txBody>
-      </p:sp>
-    </p:spTree>
-    <p:extLst>
-      <p:ext uri="{BB962C8B-B14F-4D97-AF65-F5344CB8AC3E}">
-        <p14:creationId xmlns:p14="http://schemas.microsoft.com/office/powerpoint/2010/main" val="3312542730"/>
-      </p:ext>
-    </p:extLst>
-  </p:cSld>
-  <p:clrMapOvr>
-    <a:masterClrMapping/>
-  </p:clrMapOvr>
-</p:sld>
-</file>
-
-<file path=ppt/slides/slide5.xml><?xml version="1.0" encoding="utf-8"?>
-<p:sld xmlns:a="http://schemas.openxmlformats.org/drawingml/2006/main" xmlns:r="http://schemas.openxmlformats.org/officeDocument/2006/relationships" xmlns:p="http://schemas.openxmlformats.org/presentationml/2006/main">
-  <p:cSld>
-    <p:spTree>
-      <p:nvGrpSpPr>
-        <p:cNvPr id="1" name=""/>
-        <p:cNvGrpSpPr/>
-        <p:nvPr/>
-      </p:nvGrpSpPr>
-      <p:grpSpPr>
-        <a:xfrm>
-          <a:off x="0" y="0"/>
-          <a:ext cx="0" cy="0"/>
-          <a:chOff x="0" y="0"/>
-          <a:chExt cx="0" cy="0"/>
-        </a:xfrm>
-      </p:grpSpPr>
       <p:graphicFrame>
         <p:nvGraphicFramePr>
           <p:cNvPr id="8" name="Table 4">
@@ -16278,6 +15310,938 @@
 </p:sld>
 </file>
 
+<file path=ppt/slides/slide5.xml><?xml version="1.0" encoding="utf-8"?>
+<p:sld xmlns:a="http://schemas.openxmlformats.org/drawingml/2006/main" xmlns:r="http://schemas.openxmlformats.org/officeDocument/2006/relationships" xmlns:p="http://schemas.openxmlformats.org/presentationml/2006/main">
+  <p:cSld>
+    <p:spTree>
+      <p:nvGrpSpPr>
+        <p:cNvPr id="1" name=""/>
+        <p:cNvGrpSpPr/>
+        <p:nvPr/>
+      </p:nvGrpSpPr>
+      <p:grpSpPr>
+        <a:xfrm>
+          <a:off x="0" y="0"/>
+          <a:ext cx="0" cy="0"/>
+          <a:chOff x="0" y="0"/>
+          <a:chExt cx="0" cy="0"/>
+        </a:xfrm>
+      </p:grpSpPr>
+      <p:sp>
+        <p:nvSpPr>
+          <p:cNvPr id="11" name="Title 1">
+            <a:extLst>
+              <a:ext uri="{FF2B5EF4-FFF2-40B4-BE49-F238E27FC236}">
+                <a16:creationId xmlns:a16="http://schemas.microsoft.com/office/drawing/2014/main" id="{862773AA-BC62-4AEE-851B-F2B7440D883C}"/>
+              </a:ext>
+            </a:extLst>
+          </p:cNvPr>
+          <p:cNvSpPr txBox="1">
+            <a:spLocks/>
+          </p:cNvSpPr>
+          <p:nvPr/>
+        </p:nvSpPr>
+        <p:spPr>
+          <a:xfrm>
+            <a:off x="838200" y="365125"/>
+            <a:ext cx="10515600" cy="1325563"/>
+          </a:xfrm>
+          <a:prstGeom prst="rect">
+            <a:avLst/>
+          </a:prstGeom>
+        </p:spPr>
+        <p:txBody>
+          <a:bodyPr vert="horz" lIns="91440" tIns="45720" rIns="91440" bIns="45720" rtlCol="0" anchor="ctr">
+            <a:normAutofit/>
+          </a:bodyPr>
+          <a:lstStyle>
+            <a:lvl1pPr algn="l" defTabSz="914400" rtl="0" eaLnBrk="1" latinLnBrk="0" hangingPunct="1">
+              <a:lnSpc>
+                <a:spcPct val="90000"/>
+              </a:lnSpc>
+              <a:spcBef>
+                <a:spcPct val="0"/>
+              </a:spcBef>
+              <a:buNone/>
+              <a:defRPr sz="4400" kern="1200">
+                <a:solidFill>
+                  <a:schemeClr val="tx1"/>
+                </a:solidFill>
+                <a:latin typeface="+mj-lt"/>
+                <a:ea typeface="+mj-ea"/>
+                <a:cs typeface="+mj-cs"/>
+              </a:defRPr>
+            </a:lvl1pPr>
+          </a:lstStyle>
+          <a:p>
+            <a:r>
+              <a:rPr lang="en-US" dirty="0"/>
+              <a:t>Code Parallelization</a:t>
+            </a:r>
+          </a:p>
+        </p:txBody>
+      </p:sp>
+      <p:sp>
+        <p:nvSpPr>
+          <p:cNvPr id="16" name="Cube 15">
+            <a:extLst>
+              <a:ext uri="{FF2B5EF4-FFF2-40B4-BE49-F238E27FC236}">
+                <a16:creationId xmlns:a16="http://schemas.microsoft.com/office/drawing/2014/main" id="{75C03A65-967A-4A9B-B4E9-7ECDD124D2C4}"/>
+              </a:ext>
+            </a:extLst>
+          </p:cNvPr>
+          <p:cNvSpPr/>
+          <p:nvPr/>
+        </p:nvSpPr>
+        <p:spPr>
+          <a:xfrm>
+            <a:off x="2988734" y="2147355"/>
+            <a:ext cx="1210733" cy="1083733"/>
+          </a:xfrm>
+          <a:prstGeom prst="cube">
+            <a:avLst>
+              <a:gd name="adj" fmla="val 19624"/>
+            </a:avLst>
+          </a:prstGeom>
+          <a:noFill/>
+          <a:ln w="28575">
+            <a:solidFill>
+              <a:schemeClr val="tx1"/>
+            </a:solidFill>
+          </a:ln>
+        </p:spPr>
+        <p:style>
+          <a:lnRef idx="2">
+            <a:schemeClr val="accent1">
+              <a:shade val="50000"/>
+            </a:schemeClr>
+          </a:lnRef>
+          <a:fillRef idx="1">
+            <a:schemeClr val="accent1"/>
+          </a:fillRef>
+          <a:effectRef idx="0">
+            <a:schemeClr val="accent1"/>
+          </a:effectRef>
+          <a:fontRef idx="minor">
+            <a:schemeClr val="lt1"/>
+          </a:fontRef>
+        </p:style>
+        <p:txBody>
+          <a:bodyPr rtlCol="0" anchor="ctr"/>
+          <a:lstStyle/>
+          <a:p>
+            <a:pPr algn="ctr"/>
+            <a:r>
+              <a:rPr lang="en-US" sz="800" dirty="0">
+                <a:solidFill>
+                  <a:schemeClr val="tx1"/>
+                </a:solidFill>
+                <a:latin typeface="Microsoft JhengHei" panose="020B0604030504040204" pitchFamily="34" charset="-120"/>
+                <a:ea typeface="Microsoft JhengHei" panose="020B0604030504040204" pitchFamily="34" charset="-120"/>
+              </a:rPr>
+              <a:t>ComputerNew1</a:t>
+            </a:r>
+          </a:p>
+        </p:txBody>
+      </p:sp>
+      <p:sp>
+        <p:nvSpPr>
+          <p:cNvPr id="17" name="Cube 16">
+            <a:extLst>
+              <a:ext uri="{FF2B5EF4-FFF2-40B4-BE49-F238E27FC236}">
+                <a16:creationId xmlns:a16="http://schemas.microsoft.com/office/drawing/2014/main" id="{7C8A192A-11A8-414F-BB34-9C1FEE37B16F}"/>
+              </a:ext>
+            </a:extLst>
+          </p:cNvPr>
+          <p:cNvSpPr/>
+          <p:nvPr/>
+        </p:nvSpPr>
+        <p:spPr>
+          <a:xfrm>
+            <a:off x="4343401" y="2147355"/>
+            <a:ext cx="1210733" cy="1083733"/>
+          </a:xfrm>
+          <a:prstGeom prst="cube">
+            <a:avLst>
+              <a:gd name="adj" fmla="val 19624"/>
+            </a:avLst>
+          </a:prstGeom>
+          <a:noFill/>
+          <a:ln w="28575">
+            <a:solidFill>
+              <a:schemeClr val="tx1"/>
+            </a:solidFill>
+          </a:ln>
+        </p:spPr>
+        <p:style>
+          <a:lnRef idx="2">
+            <a:schemeClr val="accent1">
+              <a:shade val="50000"/>
+            </a:schemeClr>
+          </a:lnRef>
+          <a:fillRef idx="1">
+            <a:schemeClr val="accent1"/>
+          </a:fillRef>
+          <a:effectRef idx="0">
+            <a:schemeClr val="accent1"/>
+          </a:effectRef>
+          <a:fontRef idx="minor">
+            <a:schemeClr val="lt1"/>
+          </a:fontRef>
+        </p:style>
+        <p:txBody>
+          <a:bodyPr rtlCol="0" anchor="ctr"/>
+          <a:lstStyle/>
+          <a:p>
+            <a:pPr algn="ctr"/>
+            <a:r>
+              <a:rPr lang="en-US" sz="800" dirty="0">
+                <a:solidFill>
+                  <a:schemeClr val="tx1"/>
+                </a:solidFill>
+                <a:latin typeface="Microsoft JhengHei" panose="020B0604030504040204" pitchFamily="34" charset="-120"/>
+                <a:ea typeface="Microsoft JhengHei" panose="020B0604030504040204" pitchFamily="34" charset="-120"/>
+              </a:rPr>
+              <a:t>ComputerNew2</a:t>
+            </a:r>
+          </a:p>
+        </p:txBody>
+      </p:sp>
+      <p:sp>
+        <p:nvSpPr>
+          <p:cNvPr id="18" name="Cube 17">
+            <a:extLst>
+              <a:ext uri="{FF2B5EF4-FFF2-40B4-BE49-F238E27FC236}">
+                <a16:creationId xmlns:a16="http://schemas.microsoft.com/office/drawing/2014/main" id="{75AF2877-7918-4495-A821-8EE62EF74E05}"/>
+              </a:ext>
+            </a:extLst>
+          </p:cNvPr>
+          <p:cNvSpPr/>
+          <p:nvPr/>
+        </p:nvSpPr>
+        <p:spPr>
+          <a:xfrm>
+            <a:off x="5710766" y="2147355"/>
+            <a:ext cx="1210733" cy="1083733"/>
+          </a:xfrm>
+          <a:prstGeom prst="cube">
+            <a:avLst>
+              <a:gd name="adj" fmla="val 19624"/>
+            </a:avLst>
+          </a:prstGeom>
+          <a:noFill/>
+          <a:ln w="28575">
+            <a:solidFill>
+              <a:schemeClr val="tx1"/>
+            </a:solidFill>
+          </a:ln>
+        </p:spPr>
+        <p:style>
+          <a:lnRef idx="2">
+            <a:schemeClr val="accent1">
+              <a:shade val="50000"/>
+            </a:schemeClr>
+          </a:lnRef>
+          <a:fillRef idx="1">
+            <a:schemeClr val="accent1"/>
+          </a:fillRef>
+          <a:effectRef idx="0">
+            <a:schemeClr val="accent1"/>
+          </a:effectRef>
+          <a:fontRef idx="minor">
+            <a:schemeClr val="lt1"/>
+          </a:fontRef>
+        </p:style>
+        <p:txBody>
+          <a:bodyPr rtlCol="0" anchor="ctr"/>
+          <a:lstStyle/>
+          <a:p>
+            <a:pPr algn="ctr"/>
+            <a:r>
+              <a:rPr lang="en-US" sz="800" dirty="0">
+                <a:solidFill>
+                  <a:schemeClr val="tx1"/>
+                </a:solidFill>
+                <a:latin typeface="Microsoft JhengHei" panose="020B0604030504040204" pitchFamily="34" charset="-120"/>
+                <a:ea typeface="Microsoft JhengHei" panose="020B0604030504040204" pitchFamily="34" charset="-120"/>
+              </a:rPr>
+              <a:t>ComputerOld1</a:t>
+            </a:r>
+          </a:p>
+        </p:txBody>
+      </p:sp>
+      <p:sp>
+        <p:nvSpPr>
+          <p:cNvPr id="19" name="Cube 18">
+            <a:extLst>
+              <a:ext uri="{FF2B5EF4-FFF2-40B4-BE49-F238E27FC236}">
+                <a16:creationId xmlns:a16="http://schemas.microsoft.com/office/drawing/2014/main" id="{F0BC7486-FEDF-4092-A144-0E7EB818219A}"/>
+              </a:ext>
+            </a:extLst>
+          </p:cNvPr>
+          <p:cNvSpPr/>
+          <p:nvPr/>
+        </p:nvSpPr>
+        <p:spPr>
+          <a:xfrm>
+            <a:off x="7141633" y="2147355"/>
+            <a:ext cx="1210733" cy="1083733"/>
+          </a:xfrm>
+          <a:prstGeom prst="cube">
+            <a:avLst>
+              <a:gd name="adj" fmla="val 19624"/>
+            </a:avLst>
+          </a:prstGeom>
+          <a:noFill/>
+          <a:ln w="28575">
+            <a:solidFill>
+              <a:schemeClr val="tx1"/>
+            </a:solidFill>
+          </a:ln>
+        </p:spPr>
+        <p:style>
+          <a:lnRef idx="2">
+            <a:schemeClr val="accent1">
+              <a:shade val="50000"/>
+            </a:schemeClr>
+          </a:lnRef>
+          <a:fillRef idx="1">
+            <a:schemeClr val="accent1"/>
+          </a:fillRef>
+          <a:effectRef idx="0">
+            <a:schemeClr val="accent1"/>
+          </a:effectRef>
+          <a:fontRef idx="minor">
+            <a:schemeClr val="lt1"/>
+          </a:fontRef>
+        </p:style>
+        <p:txBody>
+          <a:bodyPr rtlCol="0" anchor="ctr"/>
+          <a:lstStyle/>
+          <a:p>
+            <a:pPr algn="ctr"/>
+            <a:r>
+              <a:rPr lang="en-US" sz="800" dirty="0">
+                <a:solidFill>
+                  <a:schemeClr val="tx1"/>
+                </a:solidFill>
+                <a:latin typeface="Microsoft JhengHei" panose="020B0604030504040204" pitchFamily="34" charset="-120"/>
+                <a:ea typeface="Microsoft JhengHei" panose="020B0604030504040204" pitchFamily="34" charset="-120"/>
+              </a:rPr>
+              <a:t>ComputerOld2</a:t>
+            </a:r>
+          </a:p>
+        </p:txBody>
+      </p:sp>
+      <p:sp>
+        <p:nvSpPr>
+          <p:cNvPr id="20" name="Cube 19">
+            <a:extLst>
+              <a:ext uri="{FF2B5EF4-FFF2-40B4-BE49-F238E27FC236}">
+                <a16:creationId xmlns:a16="http://schemas.microsoft.com/office/drawing/2014/main" id="{13D37479-399F-4957-A7C6-8387A5895065}"/>
+              </a:ext>
+            </a:extLst>
+          </p:cNvPr>
+          <p:cNvSpPr/>
+          <p:nvPr/>
+        </p:nvSpPr>
+        <p:spPr>
+          <a:xfrm>
+            <a:off x="2988734" y="4366774"/>
+            <a:ext cx="1210733" cy="1083733"/>
+          </a:xfrm>
+          <a:prstGeom prst="cube">
+            <a:avLst>
+              <a:gd name="adj" fmla="val 19624"/>
+            </a:avLst>
+          </a:prstGeom>
+          <a:noFill/>
+          <a:ln w="28575">
+            <a:solidFill>
+              <a:schemeClr val="tx1"/>
+            </a:solidFill>
+          </a:ln>
+        </p:spPr>
+        <p:style>
+          <a:lnRef idx="2">
+            <a:schemeClr val="accent1">
+              <a:shade val="50000"/>
+            </a:schemeClr>
+          </a:lnRef>
+          <a:fillRef idx="1">
+            <a:schemeClr val="accent1"/>
+          </a:fillRef>
+          <a:effectRef idx="0">
+            <a:schemeClr val="accent1"/>
+          </a:effectRef>
+          <a:fontRef idx="minor">
+            <a:schemeClr val="lt1"/>
+          </a:fontRef>
+        </p:style>
+        <p:txBody>
+          <a:bodyPr rtlCol="0" anchor="ctr"/>
+          <a:lstStyle/>
+          <a:p>
+            <a:pPr algn="ctr"/>
+            <a:r>
+              <a:rPr lang="en-US" sz="800" dirty="0">
+                <a:solidFill>
+                  <a:schemeClr val="tx1"/>
+                </a:solidFill>
+                <a:latin typeface="Microsoft JhengHei" panose="020B0604030504040204" pitchFamily="34" charset="-120"/>
+                <a:ea typeface="Microsoft JhengHei" panose="020B0604030504040204" pitchFamily="34" charset="-120"/>
+              </a:rPr>
+              <a:t>Colab1</a:t>
+            </a:r>
+          </a:p>
+        </p:txBody>
+      </p:sp>
+      <p:sp>
+        <p:nvSpPr>
+          <p:cNvPr id="21" name="Cube 20">
+            <a:extLst>
+              <a:ext uri="{FF2B5EF4-FFF2-40B4-BE49-F238E27FC236}">
+                <a16:creationId xmlns:a16="http://schemas.microsoft.com/office/drawing/2014/main" id="{79A342B8-D08C-4B31-92EC-3A2A09B37437}"/>
+              </a:ext>
+            </a:extLst>
+          </p:cNvPr>
+          <p:cNvSpPr/>
+          <p:nvPr/>
+        </p:nvSpPr>
+        <p:spPr>
+          <a:xfrm>
+            <a:off x="4419601" y="4366774"/>
+            <a:ext cx="1210733" cy="1083733"/>
+          </a:xfrm>
+          <a:prstGeom prst="cube">
+            <a:avLst>
+              <a:gd name="adj" fmla="val 19624"/>
+            </a:avLst>
+          </a:prstGeom>
+          <a:noFill/>
+          <a:ln w="28575">
+            <a:solidFill>
+              <a:schemeClr val="tx1"/>
+            </a:solidFill>
+          </a:ln>
+        </p:spPr>
+        <p:style>
+          <a:lnRef idx="2">
+            <a:schemeClr val="accent1">
+              <a:shade val="50000"/>
+            </a:schemeClr>
+          </a:lnRef>
+          <a:fillRef idx="1">
+            <a:schemeClr val="accent1"/>
+          </a:fillRef>
+          <a:effectRef idx="0">
+            <a:schemeClr val="accent1"/>
+          </a:effectRef>
+          <a:fontRef idx="minor">
+            <a:schemeClr val="lt1"/>
+          </a:fontRef>
+        </p:style>
+        <p:txBody>
+          <a:bodyPr rtlCol="0" anchor="ctr"/>
+          <a:lstStyle/>
+          <a:p>
+            <a:pPr algn="ctr"/>
+            <a:r>
+              <a:rPr lang="en-US" sz="800" dirty="0">
+                <a:solidFill>
+                  <a:schemeClr val="tx1"/>
+                </a:solidFill>
+                <a:latin typeface="Microsoft JhengHei" panose="020B0604030504040204" pitchFamily="34" charset="-120"/>
+                <a:ea typeface="Microsoft JhengHei" panose="020B0604030504040204" pitchFamily="34" charset="-120"/>
+              </a:rPr>
+              <a:t>Colab2</a:t>
+            </a:r>
+          </a:p>
+        </p:txBody>
+      </p:sp>
+      <p:sp>
+        <p:nvSpPr>
+          <p:cNvPr id="22" name="Cube 21">
+            <a:extLst>
+              <a:ext uri="{FF2B5EF4-FFF2-40B4-BE49-F238E27FC236}">
+                <a16:creationId xmlns:a16="http://schemas.microsoft.com/office/drawing/2014/main" id="{5AFD9427-1498-47BB-8FE3-A4AA29FD3964}"/>
+              </a:ext>
+            </a:extLst>
+          </p:cNvPr>
+          <p:cNvSpPr/>
+          <p:nvPr/>
+        </p:nvSpPr>
+        <p:spPr>
+          <a:xfrm>
+            <a:off x="5786966" y="4366774"/>
+            <a:ext cx="1210733" cy="1083733"/>
+          </a:xfrm>
+          <a:prstGeom prst="cube">
+            <a:avLst>
+              <a:gd name="adj" fmla="val 19624"/>
+            </a:avLst>
+          </a:prstGeom>
+          <a:noFill/>
+          <a:ln w="28575">
+            <a:solidFill>
+              <a:schemeClr val="tx1"/>
+            </a:solidFill>
+          </a:ln>
+        </p:spPr>
+        <p:style>
+          <a:lnRef idx="2">
+            <a:schemeClr val="accent1">
+              <a:shade val="50000"/>
+            </a:schemeClr>
+          </a:lnRef>
+          <a:fillRef idx="1">
+            <a:schemeClr val="accent1"/>
+          </a:fillRef>
+          <a:effectRef idx="0">
+            <a:schemeClr val="accent1"/>
+          </a:effectRef>
+          <a:fontRef idx="minor">
+            <a:schemeClr val="lt1"/>
+          </a:fontRef>
+        </p:style>
+        <p:txBody>
+          <a:bodyPr rtlCol="0" anchor="ctr"/>
+          <a:lstStyle/>
+          <a:p>
+            <a:pPr algn="ctr"/>
+            <a:r>
+              <a:rPr lang="en-US" sz="800" dirty="0">
+                <a:solidFill>
+                  <a:schemeClr val="tx1"/>
+                </a:solidFill>
+                <a:latin typeface="Microsoft JhengHei" panose="020B0604030504040204" pitchFamily="34" charset="-120"/>
+                <a:ea typeface="Microsoft JhengHei" panose="020B0604030504040204" pitchFamily="34" charset="-120"/>
+              </a:rPr>
+              <a:t>Colab3</a:t>
+            </a:r>
+          </a:p>
+        </p:txBody>
+      </p:sp>
+      <p:sp>
+        <p:nvSpPr>
+          <p:cNvPr id="23" name="Cube 22">
+            <a:extLst>
+              <a:ext uri="{FF2B5EF4-FFF2-40B4-BE49-F238E27FC236}">
+                <a16:creationId xmlns:a16="http://schemas.microsoft.com/office/drawing/2014/main" id="{935BB193-DEA9-4029-A413-DC4F6ED7E38F}"/>
+              </a:ext>
+            </a:extLst>
+          </p:cNvPr>
+          <p:cNvSpPr/>
+          <p:nvPr/>
+        </p:nvSpPr>
+        <p:spPr>
+          <a:xfrm>
+            <a:off x="7217833" y="4366774"/>
+            <a:ext cx="1210733" cy="1083733"/>
+          </a:xfrm>
+          <a:prstGeom prst="cube">
+            <a:avLst>
+              <a:gd name="adj" fmla="val 19624"/>
+            </a:avLst>
+          </a:prstGeom>
+          <a:noFill/>
+          <a:ln w="28575">
+            <a:solidFill>
+              <a:schemeClr val="tx1"/>
+            </a:solidFill>
+          </a:ln>
+        </p:spPr>
+        <p:style>
+          <a:lnRef idx="2">
+            <a:schemeClr val="accent1">
+              <a:shade val="50000"/>
+            </a:schemeClr>
+          </a:lnRef>
+          <a:fillRef idx="1">
+            <a:schemeClr val="accent1"/>
+          </a:fillRef>
+          <a:effectRef idx="0">
+            <a:schemeClr val="accent1"/>
+          </a:effectRef>
+          <a:fontRef idx="minor">
+            <a:schemeClr val="lt1"/>
+          </a:fontRef>
+        </p:style>
+        <p:txBody>
+          <a:bodyPr rtlCol="0" anchor="ctr"/>
+          <a:lstStyle/>
+          <a:p>
+            <a:pPr algn="ctr"/>
+            <a:r>
+              <a:rPr lang="en-US" sz="800" dirty="0">
+                <a:solidFill>
+                  <a:schemeClr val="tx1"/>
+                </a:solidFill>
+                <a:latin typeface="Microsoft JhengHei" panose="020B0604030504040204" pitchFamily="34" charset="-120"/>
+                <a:ea typeface="Microsoft JhengHei" panose="020B0604030504040204" pitchFamily="34" charset="-120"/>
+              </a:rPr>
+              <a:t>Colab4</a:t>
+            </a:r>
+          </a:p>
+        </p:txBody>
+      </p:sp>
+      <p:sp>
+        <p:nvSpPr>
+          <p:cNvPr id="32" name="TextBox 31">
+            <a:extLst>
+              <a:ext uri="{FF2B5EF4-FFF2-40B4-BE49-F238E27FC236}">
+                <a16:creationId xmlns:a16="http://schemas.microsoft.com/office/drawing/2014/main" id="{B6D4D738-0B22-46C3-BF0C-ED2DEBD786E3}"/>
+              </a:ext>
+            </a:extLst>
+          </p:cNvPr>
+          <p:cNvSpPr txBox="1"/>
+          <p:nvPr/>
+        </p:nvSpPr>
+        <p:spPr>
+          <a:xfrm>
+            <a:off x="2988734" y="5591302"/>
+            <a:ext cx="1060450" cy="276999"/>
+          </a:xfrm>
+          <a:prstGeom prst="rect">
+            <a:avLst/>
+          </a:prstGeom>
+          <a:noFill/>
+        </p:spPr>
+        <p:txBody>
+          <a:bodyPr wrap="square">
+            <a:spAutoFit/>
+          </a:bodyPr>
+          <a:lstStyle/>
+          <a:p>
+            <a:r>
+              <a:rPr lang="en-US" sz="1200" dirty="0" err="1"/>
+              <a:t>Meteorologia</a:t>
+            </a:r>
+            <a:endParaRPr lang="en-US" dirty="0"/>
+          </a:p>
+        </p:txBody>
+      </p:sp>
+      <p:sp>
+        <p:nvSpPr>
+          <p:cNvPr id="34" name="TextBox 33">
+            <a:extLst>
+              <a:ext uri="{FF2B5EF4-FFF2-40B4-BE49-F238E27FC236}">
+                <a16:creationId xmlns:a16="http://schemas.microsoft.com/office/drawing/2014/main" id="{01833DF9-7A16-41EF-BE5D-EAF5F03A59D0}"/>
+              </a:ext>
+            </a:extLst>
+          </p:cNvPr>
+          <p:cNvSpPr txBox="1"/>
+          <p:nvPr/>
+        </p:nvSpPr>
+        <p:spPr>
+          <a:xfrm>
+            <a:off x="5923494" y="3326619"/>
+            <a:ext cx="1060450" cy="276999"/>
+          </a:xfrm>
+          <a:prstGeom prst="rect">
+            <a:avLst/>
+          </a:prstGeom>
+          <a:noFill/>
+        </p:spPr>
+        <p:txBody>
+          <a:bodyPr wrap="square">
+            <a:spAutoFit/>
+          </a:bodyPr>
+          <a:lstStyle/>
+          <a:p>
+            <a:r>
+              <a:rPr lang="en-US" sz="1200" dirty="0" err="1"/>
+              <a:t>Saúde</a:t>
+            </a:r>
+            <a:endParaRPr lang="en-US" dirty="0"/>
+          </a:p>
+        </p:txBody>
+      </p:sp>
+      <p:sp>
+        <p:nvSpPr>
+          <p:cNvPr id="36" name="TextBox 35">
+            <a:extLst>
+              <a:ext uri="{FF2B5EF4-FFF2-40B4-BE49-F238E27FC236}">
+                <a16:creationId xmlns:a16="http://schemas.microsoft.com/office/drawing/2014/main" id="{DA82FB58-CBC8-458C-B8EF-F63EE65D41FB}"/>
+              </a:ext>
+            </a:extLst>
+          </p:cNvPr>
+          <p:cNvSpPr txBox="1"/>
+          <p:nvPr/>
+        </p:nvSpPr>
+        <p:spPr>
+          <a:xfrm>
+            <a:off x="4343400" y="3367317"/>
+            <a:ext cx="1210733" cy="276999"/>
+          </a:xfrm>
+          <a:prstGeom prst="rect">
+            <a:avLst/>
+          </a:prstGeom>
+          <a:noFill/>
+        </p:spPr>
+        <p:txBody>
+          <a:bodyPr wrap="square">
+            <a:spAutoFit/>
+          </a:bodyPr>
+          <a:lstStyle/>
+          <a:p>
+            <a:r>
+              <a:rPr lang="en-US" sz="1200" dirty="0"/>
+              <a:t>Synthetic2 (100)</a:t>
+            </a:r>
+            <a:endParaRPr lang="en-US" dirty="0"/>
+          </a:p>
+        </p:txBody>
+      </p:sp>
+      <p:sp>
+        <p:nvSpPr>
+          <p:cNvPr id="39" name="TextBox 38">
+            <a:extLst>
+              <a:ext uri="{FF2B5EF4-FFF2-40B4-BE49-F238E27FC236}">
+                <a16:creationId xmlns:a16="http://schemas.microsoft.com/office/drawing/2014/main" id="{DB287132-0E88-4361-9769-23F4415BE703}"/>
+              </a:ext>
+            </a:extLst>
+          </p:cNvPr>
+          <p:cNvSpPr txBox="1"/>
+          <p:nvPr/>
+        </p:nvSpPr>
+        <p:spPr>
+          <a:xfrm>
+            <a:off x="4338109" y="5591302"/>
+            <a:ext cx="1615016" cy="276999"/>
+          </a:xfrm>
+          <a:prstGeom prst="rect">
+            <a:avLst/>
+          </a:prstGeom>
+          <a:noFill/>
+        </p:spPr>
+        <p:txBody>
+          <a:bodyPr wrap="square">
+            <a:spAutoFit/>
+          </a:bodyPr>
+          <a:lstStyle/>
+          <a:p>
+            <a:r>
+              <a:rPr lang="en-US" sz="1200" dirty="0"/>
+              <a:t>Economia/</a:t>
+            </a:r>
+            <a:r>
+              <a:rPr lang="en-US" sz="1200" dirty="0" err="1"/>
+              <a:t>Finanças</a:t>
+            </a:r>
+            <a:endParaRPr lang="en-US" sz="1200" dirty="0"/>
+          </a:p>
+        </p:txBody>
+      </p:sp>
+      <p:sp>
+        <p:nvSpPr>
+          <p:cNvPr id="40" name="TextBox 39">
+            <a:extLst>
+              <a:ext uri="{FF2B5EF4-FFF2-40B4-BE49-F238E27FC236}">
+                <a16:creationId xmlns:a16="http://schemas.microsoft.com/office/drawing/2014/main" id="{E3C6EDFB-F868-4F47-A35C-2CAA20A0D67B}"/>
+              </a:ext>
+            </a:extLst>
+          </p:cNvPr>
+          <p:cNvSpPr txBox="1"/>
+          <p:nvPr/>
+        </p:nvSpPr>
+        <p:spPr>
+          <a:xfrm>
+            <a:off x="6921499" y="3383432"/>
+            <a:ext cx="1615016" cy="276999"/>
+          </a:xfrm>
+          <a:prstGeom prst="rect">
+            <a:avLst/>
+          </a:prstGeom>
+          <a:noFill/>
+        </p:spPr>
+        <p:txBody>
+          <a:bodyPr wrap="square">
+            <a:spAutoFit/>
+          </a:bodyPr>
+          <a:lstStyle/>
+          <a:p>
+            <a:r>
+              <a:rPr lang="en-US" sz="1200" dirty="0" err="1"/>
+              <a:t>Engenharia</a:t>
+            </a:r>
+            <a:r>
+              <a:rPr lang="en-US" sz="1200" dirty="0"/>
+              <a:t>/</a:t>
+            </a:r>
+            <a:r>
+              <a:rPr lang="en-US" sz="1200" dirty="0" err="1"/>
+              <a:t>Ciência</a:t>
+            </a:r>
+            <a:endParaRPr lang="en-US" sz="1200" dirty="0"/>
+          </a:p>
+        </p:txBody>
+      </p:sp>
+      <p:sp>
+        <p:nvSpPr>
+          <p:cNvPr id="41" name="TextBox 40">
+            <a:extLst>
+              <a:ext uri="{FF2B5EF4-FFF2-40B4-BE49-F238E27FC236}">
+                <a16:creationId xmlns:a16="http://schemas.microsoft.com/office/drawing/2014/main" id="{B1B77228-F59D-426A-81F6-53FA0EA18485}"/>
+              </a:ext>
+            </a:extLst>
+          </p:cNvPr>
+          <p:cNvSpPr txBox="1"/>
+          <p:nvPr/>
+        </p:nvSpPr>
+        <p:spPr>
+          <a:xfrm>
+            <a:off x="5953125" y="5551557"/>
+            <a:ext cx="1134533" cy="461665"/>
+          </a:xfrm>
+          <a:prstGeom prst="rect">
+            <a:avLst/>
+          </a:prstGeom>
+          <a:noFill/>
+        </p:spPr>
+        <p:txBody>
+          <a:bodyPr wrap="square">
+            <a:spAutoFit/>
+          </a:bodyPr>
+          <a:lstStyle/>
+          <a:p>
+            <a:r>
+              <a:rPr lang="en-US" sz="1200" dirty="0" err="1"/>
+              <a:t>Transportes</a:t>
+            </a:r>
+            <a:r>
+              <a:rPr lang="en-US" sz="1200" dirty="0"/>
+              <a:t> e </a:t>
+            </a:r>
+            <a:r>
+              <a:rPr lang="en-US" sz="1200" dirty="0" err="1"/>
+              <a:t>Ambiente</a:t>
+            </a:r>
+            <a:endParaRPr lang="en-US" sz="1200" dirty="0"/>
+          </a:p>
+        </p:txBody>
+      </p:sp>
+      <p:sp>
+        <p:nvSpPr>
+          <p:cNvPr id="42" name="TextBox 41">
+            <a:extLst>
+              <a:ext uri="{FF2B5EF4-FFF2-40B4-BE49-F238E27FC236}">
+                <a16:creationId xmlns:a16="http://schemas.microsoft.com/office/drawing/2014/main" id="{85659775-8091-4F06-B62B-955B4AC5C232}"/>
+              </a:ext>
+            </a:extLst>
+          </p:cNvPr>
+          <p:cNvSpPr txBox="1"/>
+          <p:nvPr/>
+        </p:nvSpPr>
+        <p:spPr>
+          <a:xfrm>
+            <a:off x="2988733" y="3321186"/>
+            <a:ext cx="1273175" cy="276999"/>
+          </a:xfrm>
+          <a:prstGeom prst="rect">
+            <a:avLst/>
+          </a:prstGeom>
+          <a:noFill/>
+        </p:spPr>
+        <p:txBody>
+          <a:bodyPr wrap="square">
+            <a:spAutoFit/>
+          </a:bodyPr>
+          <a:lstStyle/>
+          <a:p>
+            <a:r>
+              <a:rPr lang="en-US" sz="1200" dirty="0"/>
+              <a:t>Synthetic1 (100)</a:t>
+            </a:r>
+            <a:endParaRPr lang="en-US" dirty="0"/>
+          </a:p>
+        </p:txBody>
+      </p:sp>
+      <p:sp>
+        <p:nvSpPr>
+          <p:cNvPr id="43" name="TextBox 42">
+            <a:extLst>
+              <a:ext uri="{FF2B5EF4-FFF2-40B4-BE49-F238E27FC236}">
+                <a16:creationId xmlns:a16="http://schemas.microsoft.com/office/drawing/2014/main" id="{C432B307-74B9-4158-A2A1-33192E614265}"/>
+              </a:ext>
+            </a:extLst>
+          </p:cNvPr>
+          <p:cNvSpPr txBox="1"/>
+          <p:nvPr/>
+        </p:nvSpPr>
+        <p:spPr>
+          <a:xfrm>
+            <a:off x="2988733" y="3633108"/>
+            <a:ext cx="1210733" cy="276999"/>
+          </a:xfrm>
+          <a:prstGeom prst="rect">
+            <a:avLst/>
+          </a:prstGeom>
+          <a:noFill/>
+        </p:spPr>
+        <p:txBody>
+          <a:bodyPr wrap="square">
+            <a:spAutoFit/>
+          </a:bodyPr>
+          <a:lstStyle/>
+          <a:p>
+            <a:r>
+              <a:rPr lang="en-US" sz="1200" dirty="0"/>
+              <a:t>Synthetic3 (100)</a:t>
+            </a:r>
+            <a:endParaRPr lang="en-US" dirty="0"/>
+          </a:p>
+        </p:txBody>
+      </p:sp>
+      <p:sp>
+        <p:nvSpPr>
+          <p:cNvPr id="44" name="TextBox 43">
+            <a:extLst>
+              <a:ext uri="{FF2B5EF4-FFF2-40B4-BE49-F238E27FC236}">
+                <a16:creationId xmlns:a16="http://schemas.microsoft.com/office/drawing/2014/main" id="{253AF8D6-5BF9-4C1C-9C24-869D72D88A6F}"/>
+              </a:ext>
+            </a:extLst>
+          </p:cNvPr>
+          <p:cNvSpPr txBox="1"/>
+          <p:nvPr/>
+        </p:nvSpPr>
+        <p:spPr>
+          <a:xfrm>
+            <a:off x="7368116" y="5591302"/>
+            <a:ext cx="1060450" cy="276999"/>
+          </a:xfrm>
+          <a:prstGeom prst="rect">
+            <a:avLst/>
+          </a:prstGeom>
+          <a:noFill/>
+        </p:spPr>
+        <p:txBody>
+          <a:bodyPr wrap="square">
+            <a:spAutoFit/>
+          </a:bodyPr>
+          <a:lstStyle/>
+          <a:p>
+            <a:r>
+              <a:rPr lang="en-US" sz="1200" dirty="0" err="1"/>
+              <a:t>Energia</a:t>
+            </a:r>
+            <a:endParaRPr lang="en-US" dirty="0"/>
+          </a:p>
+        </p:txBody>
+      </p:sp>
+    </p:spTree>
+    <p:extLst>
+      <p:ext uri="{BB962C8B-B14F-4D97-AF65-F5344CB8AC3E}">
+        <p14:creationId xmlns:p14="http://schemas.microsoft.com/office/powerpoint/2010/main" val="3312542730"/>
+      </p:ext>
+    </p:extLst>
+  </p:cSld>
+  <p:clrMapOvr>
+    <a:masterClrMapping/>
+  </p:clrMapOvr>
+</p:sld>
+</file>
+
 <file path=ppt/slides/slide6.xml><?xml version="1.0" encoding="utf-8"?>
 <p:sld xmlns:a="http://schemas.openxmlformats.org/drawingml/2006/main" xmlns:r="http://schemas.openxmlformats.org/officeDocument/2006/relationships" xmlns:p="http://schemas.openxmlformats.org/presentationml/2006/main">
   <p:cSld>

</xml_diff>